<commit_message>
listado de contactos de pares académicos
upload link is broken
</commit_message>
<xml_diff>
--- a/2.2.ThermodynamicsOfMaterials/classActivity02/classActivity02.pptx
+++ b/2.2.ThermodynamicsOfMaterials/classActivity02/classActivity02.pptx
@@ -452,6 +452,92 @@
     </pc:docChg>
   </pc:docChgLst>
   <pc:docChgLst>
+    <pc:chgData name="Antonio Osamu Katagiri Tanaka" userId="2c28225e-d492-4964-8551-1b0a3c65dda0" providerId="ADAL" clId="{C59DF1F7-432E-4893-B28C-5D3B004F8374}"/>
+    <pc:docChg chg="undo redo custSel addSld delSld modSld sldOrd delSection modSection">
+      <pc:chgData name="Antonio Osamu Katagiri Tanaka" userId="2c28225e-d492-4964-8551-1b0a3c65dda0" providerId="ADAL" clId="{C59DF1F7-432E-4893-B28C-5D3B004F8374}" dt="2019-03-31T14:59:20.878" v="389" actId="20577"/>
+      <pc:docMkLst>
+        <pc:docMk/>
+      </pc:docMkLst>
+      <pc:sldChg chg="modSp">
+        <pc:chgData name="Antonio Osamu Katagiri Tanaka" userId="2c28225e-d492-4964-8551-1b0a3c65dda0" providerId="ADAL" clId="{C59DF1F7-432E-4893-B28C-5D3B004F8374}" dt="2019-03-30T15:24:08.167" v="64" actId="1440"/>
+        <pc:sldMkLst>
+          <pc:docMk/>
+          <pc:sldMk cId="4056039362" sldId="260"/>
+        </pc:sldMkLst>
+        <pc:picChg chg="mod">
+          <ac:chgData name="Antonio Osamu Katagiri Tanaka" userId="2c28225e-d492-4964-8551-1b0a3c65dda0" providerId="ADAL" clId="{C59DF1F7-432E-4893-B28C-5D3B004F8374}" dt="2019-03-30T15:24:08.167" v="64" actId="1440"/>
+          <ac:picMkLst>
+            <pc:docMk/>
+            <pc:sldMk cId="4056039362" sldId="260"/>
+            <ac:picMk id="13" creationId="{8578D0BD-CD2C-44B1-976E-1029D186D2DF}"/>
+          </ac:picMkLst>
+        </pc:picChg>
+      </pc:sldChg>
+      <pc:sldChg chg="ord">
+        <pc:chgData name="Antonio Osamu Katagiri Tanaka" userId="2c28225e-d492-4964-8551-1b0a3c65dda0" providerId="ADAL" clId="{C59DF1F7-432E-4893-B28C-5D3B004F8374}" dt="2019-03-30T14:49:00.456" v="1"/>
+        <pc:sldMkLst>
+          <pc:docMk/>
+          <pc:sldMk cId="3604131991" sldId="263"/>
+        </pc:sldMkLst>
+      </pc:sldChg>
+      <pc:sldChg chg="addSp delSp modSp add">
+        <pc:chgData name="Antonio Osamu Katagiri Tanaka" userId="2c28225e-d492-4964-8551-1b0a3c65dda0" providerId="ADAL" clId="{C59DF1F7-432E-4893-B28C-5D3B004F8374}" dt="2019-03-30T15:01:17.755" v="32"/>
+        <pc:sldMkLst>
+          <pc:docMk/>
+          <pc:sldMk cId="4246728971" sldId="269"/>
+        </pc:sldMkLst>
+        <pc:spChg chg="add del mod">
+          <ac:chgData name="Antonio Osamu Katagiri Tanaka" userId="2c28225e-d492-4964-8551-1b0a3c65dda0" providerId="ADAL" clId="{C59DF1F7-432E-4893-B28C-5D3B004F8374}" dt="2019-03-30T14:52:53.260" v="6" actId="478"/>
+          <ac:spMkLst>
+            <pc:docMk/>
+            <pc:sldMk cId="4246728971" sldId="269"/>
+            <ac:spMk id="3" creationId="{BFCEFFC5-7335-4486-8818-2B397870E222}"/>
+          </ac:spMkLst>
+        </pc:spChg>
+        <pc:spChg chg="del">
+          <ac:chgData name="Antonio Osamu Katagiri Tanaka" userId="2c28225e-d492-4964-8551-1b0a3c65dda0" providerId="ADAL" clId="{C59DF1F7-432E-4893-B28C-5D3B004F8374}" dt="2019-03-30T14:52:51.721" v="5" actId="478"/>
+          <ac:spMkLst>
+            <pc:docMk/>
+            <pc:sldMk cId="4246728971" sldId="269"/>
+            <ac:spMk id="4" creationId="{F9ED8BE6-F7AC-4FD8-8FA8-8C683A7C2F62}"/>
+          </ac:spMkLst>
+        </pc:spChg>
+        <pc:spChg chg="del">
+          <ac:chgData name="Antonio Osamu Katagiri Tanaka" userId="2c28225e-d492-4964-8551-1b0a3c65dda0" providerId="ADAL" clId="{C59DF1F7-432E-4893-B28C-5D3B004F8374}" dt="2019-03-30T14:52:55.923" v="7" actId="478"/>
+          <ac:spMkLst>
+            <pc:docMk/>
+            <pc:sldMk cId="4246728971" sldId="269"/>
+            <ac:spMk id="6" creationId="{058630E6-31AF-4451-B084-C9809D0DA4E8}"/>
+          </ac:spMkLst>
+        </pc:spChg>
+        <pc:spChg chg="add del mod">
+          <ac:chgData name="Antonio Osamu Katagiri Tanaka" userId="2c28225e-d492-4964-8551-1b0a3c65dda0" providerId="ADAL" clId="{C59DF1F7-432E-4893-B28C-5D3B004F8374}" dt="2019-03-30T14:52:58.396" v="8" actId="478"/>
+          <ac:spMkLst>
+            <pc:docMk/>
+            <pc:sldMk cId="4246728971" sldId="269"/>
+            <ac:spMk id="7" creationId="{EFB1FD18-9FB8-4EC8-A186-B4E23A6745CA}"/>
+          </ac:spMkLst>
+        </pc:spChg>
+        <pc:spChg chg="add mod">
+          <ac:chgData name="Antonio Osamu Katagiri Tanaka" userId="2c28225e-d492-4964-8551-1b0a3c65dda0" providerId="ADAL" clId="{C59DF1F7-432E-4893-B28C-5D3B004F8374}" dt="2019-03-30T14:57:55.916" v="28" actId="403"/>
+          <ac:spMkLst>
+            <pc:docMk/>
+            <pc:sldMk cId="4246728971" sldId="269"/>
+            <ac:spMk id="9" creationId="{907DD878-B76C-4FC5-9BC3-86C7C3DB3BDA}"/>
+          </ac:spMkLst>
+        </pc:spChg>
+        <pc:picChg chg="add mod">
+          <ac:chgData name="Antonio Osamu Katagiri Tanaka" userId="2c28225e-d492-4964-8551-1b0a3c65dda0" providerId="ADAL" clId="{C59DF1F7-432E-4893-B28C-5D3B004F8374}" dt="2019-03-30T15:01:17.755" v="32"/>
+          <ac:picMkLst>
+            <pc:docMk/>
+            <pc:sldMk cId="4246728971" sldId="269"/>
+            <ac:picMk id="1026" creationId="{62C86081-2859-45C8-BAE6-D2CC488FFFF6}"/>
+          </ac:picMkLst>
+        </pc:picChg>
+      </pc:sldChg>
+    </pc:docChg>
+  </pc:docChgLst>
+  <pc:docChgLst>
     <pc:chgData name="Antonio Osamu Katagiri Tanaka" userId="2c28225e-d492-4964-8551-1b0a3c65dda0" providerId="ADAL" clId="{E8966260-3096-4054-A5E0-0A91A10A6CF4}"/>
     <pc:docChg chg="custSel delSld modSld modSection">
       <pc:chgData name="Antonio Osamu Katagiri Tanaka" userId="2c28225e-d492-4964-8551-1b0a3c65dda0" providerId="ADAL" clId="{E8966260-3096-4054-A5E0-0A91A10A6CF4}" dt="2019-05-05T18:21:47.650" v="183" actId="1076"/>
@@ -705,92 +791,6 @@
           <pc:docMk/>
           <pc:sldMk cId="3680588873" sldId="280"/>
         </pc:sldMkLst>
-      </pc:sldChg>
-    </pc:docChg>
-  </pc:docChgLst>
-  <pc:docChgLst>
-    <pc:chgData name="Antonio Osamu Katagiri Tanaka" userId="2c28225e-d492-4964-8551-1b0a3c65dda0" providerId="ADAL" clId="{C59DF1F7-432E-4893-B28C-5D3B004F8374}"/>
-    <pc:docChg chg="undo redo custSel addSld delSld modSld sldOrd delSection modSection">
-      <pc:chgData name="Antonio Osamu Katagiri Tanaka" userId="2c28225e-d492-4964-8551-1b0a3c65dda0" providerId="ADAL" clId="{C59DF1F7-432E-4893-B28C-5D3B004F8374}" dt="2019-03-31T14:59:20.878" v="389" actId="20577"/>
-      <pc:docMkLst>
-        <pc:docMk/>
-      </pc:docMkLst>
-      <pc:sldChg chg="modSp">
-        <pc:chgData name="Antonio Osamu Katagiri Tanaka" userId="2c28225e-d492-4964-8551-1b0a3c65dda0" providerId="ADAL" clId="{C59DF1F7-432E-4893-B28C-5D3B004F8374}" dt="2019-03-30T15:24:08.167" v="64" actId="1440"/>
-        <pc:sldMkLst>
-          <pc:docMk/>
-          <pc:sldMk cId="4056039362" sldId="260"/>
-        </pc:sldMkLst>
-        <pc:picChg chg="mod">
-          <ac:chgData name="Antonio Osamu Katagiri Tanaka" userId="2c28225e-d492-4964-8551-1b0a3c65dda0" providerId="ADAL" clId="{C59DF1F7-432E-4893-B28C-5D3B004F8374}" dt="2019-03-30T15:24:08.167" v="64" actId="1440"/>
-          <ac:picMkLst>
-            <pc:docMk/>
-            <pc:sldMk cId="4056039362" sldId="260"/>
-            <ac:picMk id="13" creationId="{8578D0BD-CD2C-44B1-976E-1029D186D2DF}"/>
-          </ac:picMkLst>
-        </pc:picChg>
-      </pc:sldChg>
-      <pc:sldChg chg="ord">
-        <pc:chgData name="Antonio Osamu Katagiri Tanaka" userId="2c28225e-d492-4964-8551-1b0a3c65dda0" providerId="ADAL" clId="{C59DF1F7-432E-4893-B28C-5D3B004F8374}" dt="2019-03-30T14:49:00.456" v="1"/>
-        <pc:sldMkLst>
-          <pc:docMk/>
-          <pc:sldMk cId="3604131991" sldId="263"/>
-        </pc:sldMkLst>
-      </pc:sldChg>
-      <pc:sldChg chg="addSp delSp modSp add">
-        <pc:chgData name="Antonio Osamu Katagiri Tanaka" userId="2c28225e-d492-4964-8551-1b0a3c65dda0" providerId="ADAL" clId="{C59DF1F7-432E-4893-B28C-5D3B004F8374}" dt="2019-03-30T15:01:17.755" v="32"/>
-        <pc:sldMkLst>
-          <pc:docMk/>
-          <pc:sldMk cId="4246728971" sldId="269"/>
-        </pc:sldMkLst>
-        <pc:spChg chg="add del mod">
-          <ac:chgData name="Antonio Osamu Katagiri Tanaka" userId="2c28225e-d492-4964-8551-1b0a3c65dda0" providerId="ADAL" clId="{C59DF1F7-432E-4893-B28C-5D3B004F8374}" dt="2019-03-30T14:52:53.260" v="6" actId="478"/>
-          <ac:spMkLst>
-            <pc:docMk/>
-            <pc:sldMk cId="4246728971" sldId="269"/>
-            <ac:spMk id="3" creationId="{BFCEFFC5-7335-4486-8818-2B397870E222}"/>
-          </ac:spMkLst>
-        </pc:spChg>
-        <pc:spChg chg="del">
-          <ac:chgData name="Antonio Osamu Katagiri Tanaka" userId="2c28225e-d492-4964-8551-1b0a3c65dda0" providerId="ADAL" clId="{C59DF1F7-432E-4893-B28C-5D3B004F8374}" dt="2019-03-30T14:52:51.721" v="5" actId="478"/>
-          <ac:spMkLst>
-            <pc:docMk/>
-            <pc:sldMk cId="4246728971" sldId="269"/>
-            <ac:spMk id="4" creationId="{F9ED8BE6-F7AC-4FD8-8FA8-8C683A7C2F62}"/>
-          </ac:spMkLst>
-        </pc:spChg>
-        <pc:spChg chg="del">
-          <ac:chgData name="Antonio Osamu Katagiri Tanaka" userId="2c28225e-d492-4964-8551-1b0a3c65dda0" providerId="ADAL" clId="{C59DF1F7-432E-4893-B28C-5D3B004F8374}" dt="2019-03-30T14:52:55.923" v="7" actId="478"/>
-          <ac:spMkLst>
-            <pc:docMk/>
-            <pc:sldMk cId="4246728971" sldId="269"/>
-            <ac:spMk id="6" creationId="{058630E6-31AF-4451-B084-C9809D0DA4E8}"/>
-          </ac:spMkLst>
-        </pc:spChg>
-        <pc:spChg chg="add del mod">
-          <ac:chgData name="Antonio Osamu Katagiri Tanaka" userId="2c28225e-d492-4964-8551-1b0a3c65dda0" providerId="ADAL" clId="{C59DF1F7-432E-4893-B28C-5D3B004F8374}" dt="2019-03-30T14:52:58.396" v="8" actId="478"/>
-          <ac:spMkLst>
-            <pc:docMk/>
-            <pc:sldMk cId="4246728971" sldId="269"/>
-            <ac:spMk id="7" creationId="{EFB1FD18-9FB8-4EC8-A186-B4E23A6745CA}"/>
-          </ac:spMkLst>
-        </pc:spChg>
-        <pc:spChg chg="add mod">
-          <ac:chgData name="Antonio Osamu Katagiri Tanaka" userId="2c28225e-d492-4964-8551-1b0a3c65dda0" providerId="ADAL" clId="{C59DF1F7-432E-4893-B28C-5D3B004F8374}" dt="2019-03-30T14:57:55.916" v="28" actId="403"/>
-          <ac:spMkLst>
-            <pc:docMk/>
-            <pc:sldMk cId="4246728971" sldId="269"/>
-            <ac:spMk id="9" creationId="{907DD878-B76C-4FC5-9BC3-86C7C3DB3BDA}"/>
-          </ac:spMkLst>
-        </pc:spChg>
-        <pc:picChg chg="add mod">
-          <ac:chgData name="Antonio Osamu Katagiri Tanaka" userId="2c28225e-d492-4964-8551-1b0a3c65dda0" providerId="ADAL" clId="{C59DF1F7-432E-4893-B28C-5D3B004F8374}" dt="2019-03-30T15:01:17.755" v="32"/>
-          <ac:picMkLst>
-            <pc:docMk/>
-            <pc:sldMk cId="4246728971" sldId="269"/>
-            <ac:picMk id="1026" creationId="{62C86081-2859-45C8-BAE6-D2CC488FFFF6}"/>
-          </ac:picMkLst>
-        </pc:picChg>
       </pc:sldChg>
     </pc:docChg>
   </pc:docChgLst>
@@ -4798,29 +4798,7 @@
                 </a:solidFill>
                 <a:latin typeface="Arial Nova Light" panose="020B0604020202020204" pitchFamily="34" charset="0"/>
               </a:rPr>
-              <a:t>Jose Ivan Aviles </a:t>
-            </a:r>
-            <a:r>
-              <a:rPr lang="en-GB" sz="2000">
-                <a:solidFill>
-                  <a:schemeClr val="bg1">
-                    <a:lumMod val="95000"/>
-                  </a:schemeClr>
-                </a:solidFill>
-                <a:latin typeface="Arial Nova Light" panose="020B0604020202020204" pitchFamily="34" charset="0"/>
-              </a:rPr>
-              <a:t>Castrillo A01749804@</a:t>
-            </a:r>
-            <a:r>
-              <a:rPr lang="en-GB" sz="2000" dirty="0">
-                <a:solidFill>
-                  <a:schemeClr val="bg1">
-                    <a:lumMod val="95000"/>
-                  </a:schemeClr>
-                </a:solidFill>
-                <a:latin typeface="Arial Nova Light" panose="020B0604020202020204" pitchFamily="34" charset="0"/>
-              </a:rPr>
-              <a:t>itesm.mx</a:t>
+              <a:t>Jose Ivan Aviles Castrillo A01749804@itesm.mx</a:t>
             </a:r>
           </a:p>
           <a:p>
@@ -5955,7 +5933,7 @@
           <p:nvPr>
             <p:extLst>
               <p:ext uri="{D42A27DB-BD31-4B8C-83A1-F6EECF244321}">
-                <p14:modId xmlns:p14="http://schemas.microsoft.com/office/powerpoint/2010/main" val="422332022"/>
+                <p14:modId xmlns:p14="http://schemas.microsoft.com/office/powerpoint/2010/main" val="4208705860"/>
               </p:ext>
             </p:extLst>
           </p:nvPr>
@@ -5968,7 +5946,7 @@
           <a:graphicData uri="http://schemas.openxmlformats.org/presentationml/2006/ole">
             <mc:AlternateContent xmlns:mc="http://schemas.openxmlformats.org/markup-compatibility/2006">
               <mc:Choice xmlns:v="urn:schemas-microsoft-com:vml" Requires="v">
-                <p:oleObj spid="_x0000_s4126" name="Packager Shell Object" showAsIcon="1" r:id="rId9" imgW="593280" imgH="349200" progId="Package">
+                <p:oleObj spid="_x0000_s4128" name="Packager Shell Object" showAsIcon="1" r:id="rId9" imgW="593280" imgH="349200" progId="Package">
                   <p:embed/>
                 </p:oleObj>
               </mc:Choice>
@@ -8045,7 +8023,7 @@
           <p:nvPr>
             <p:extLst>
               <p:ext uri="{D42A27DB-BD31-4B8C-83A1-F6EECF244321}">
-                <p14:modId xmlns:p14="http://schemas.microsoft.com/office/powerpoint/2010/main" val="218885651"/>
+                <p14:modId xmlns:p14="http://schemas.microsoft.com/office/powerpoint/2010/main" val="32679142"/>
               </p:ext>
             </p:extLst>
           </p:nvPr>
@@ -8058,7 +8036,7 @@
           <a:graphicData uri="http://schemas.openxmlformats.org/presentationml/2006/ole">
             <mc:AlternateContent xmlns:mc="http://schemas.openxmlformats.org/markup-compatibility/2006">
               <mc:Choice xmlns:v="urn:schemas-microsoft-com:vml" Requires="v">
-                <p:oleObj spid="_x0000_s5148" name="Packager Shell Object" showAsIcon="1" r:id="rId8" imgW="683640" imgH="349200" progId="Package">
+                <p:oleObj spid="_x0000_s5150" name="Packager Shell Object" showAsIcon="1" r:id="rId8" imgW="683640" imgH="349200" progId="Package">
                   <p:embed/>
                 </p:oleObj>
               </mc:Choice>
@@ -9681,7 +9659,7 @@
           <a:graphicData uri="http://schemas.openxmlformats.org/presentationml/2006/ole">
             <mc:AlternateContent xmlns:mc="http://schemas.openxmlformats.org/markup-compatibility/2006">
               <mc:Choice xmlns:v="urn:schemas-microsoft-com:vml" Requires="v">
-                <p:oleObj spid="_x0000_s6170" name="Packager Shell Object" showAsIcon="1" r:id="rId7" imgW="548280" imgH="349200" progId="Package">
+                <p:oleObj spid="_x0000_s6172" name="Packager Shell Object" showAsIcon="1" r:id="rId7" imgW="548280" imgH="349200" progId="Package">
                   <p:embed/>
                 </p:oleObj>
               </mc:Choice>

</xml_diff>